<commit_message>
re-order of slides from yesterday
</commit_message>
<xml_diff>
--- a/documentation/jdgFrog_PP.pptx
+++ b/documentation/jdgFrog_PP.pptx
@@ -12,16 +12,16 @@
     <p:sldId id="266" r:id="rId3"/>
     <p:sldId id="265" r:id="rId4"/>
     <p:sldId id="267" r:id="rId5"/>
-    <p:sldId id="268" r:id="rId6"/>
-    <p:sldId id="269" r:id="rId7"/>
-    <p:sldId id="259" r:id="rId8"/>
-    <p:sldId id="270" r:id="rId9"/>
-    <p:sldId id="271" r:id="rId10"/>
-    <p:sldId id="272" r:id="rId11"/>
-    <p:sldId id="263" r:id="rId12"/>
-    <p:sldId id="258" r:id="rId13"/>
-    <p:sldId id="260" r:id="rId14"/>
-    <p:sldId id="261" r:id="rId15"/>
+    <p:sldId id="261" r:id="rId6"/>
+    <p:sldId id="260" r:id="rId7"/>
+    <p:sldId id="258" r:id="rId8"/>
+    <p:sldId id="268" r:id="rId9"/>
+    <p:sldId id="269" r:id="rId10"/>
+    <p:sldId id="259" r:id="rId11"/>
+    <p:sldId id="270" r:id="rId12"/>
+    <p:sldId id="271" r:id="rId13"/>
+    <p:sldId id="272" r:id="rId14"/>
+    <p:sldId id="263" r:id="rId15"/>
     <p:sldId id="264" r:id="rId16"/>
   </p:sldIdLst>
   <p:sldSz cx="9144000" cy="6858000" type="screen4x3"/>
@@ -130,6 +130,9 @@
             <p14:sldId id="266"/>
             <p14:sldId id="265"/>
             <p14:sldId id="267"/>
+            <p14:sldId id="261"/>
+            <p14:sldId id="260"/>
+            <p14:sldId id="258"/>
             <p14:sldId id="268"/>
             <p14:sldId id="269"/>
             <p14:sldId id="259"/>
@@ -137,9 +140,6 @@
             <p14:sldId id="271"/>
             <p14:sldId id="272"/>
             <p14:sldId id="263"/>
-            <p14:sldId id="258"/>
-            <p14:sldId id="260"/>
-            <p14:sldId id="261"/>
             <p14:sldId id="264"/>
           </p14:sldIdLst>
         </p14:section>
@@ -5664,12 +5664,8 @@
           <a:lstStyle/>
           <a:p>
             <a:r>
-              <a:rPr lang="en-US" dirty="0"/>
-              <a:t>Iteration </a:t>
-            </a:r>
-            <a:r>
               <a:rPr lang="en-US" dirty="0" smtClean="0"/>
-              <a:t>4</a:t>
+              <a:t>Iteration 1</a:t>
             </a:r>
             <a:endParaRPr lang="en-US" dirty="0"/>
           </a:p>
@@ -5690,58 +5686,52 @@
           <a:bodyPr/>
           <a:lstStyle/>
           <a:p>
-            <a:pPr lvl="0"/>
             <a:r>
               <a:rPr lang="en-US" dirty="0" smtClean="0"/>
               <a:t> </a:t>
             </a:r>
             <a:r>
-              <a:rPr lang="en-US" b="1" i="1" dirty="0"/>
-              <a:t>April 8, 2015</a:t>
-            </a:r>
-            <a:r>
               <a:rPr lang="en-US" i="1" dirty="0"/>
+              <a:t>December 15, 2014</a:t>
+            </a:r>
+            <a:r>
+              <a:rPr lang="en-US" u="sng" dirty="0"/>
               <a:t> </a:t>
             </a:r>
             <a:r>
-              <a:rPr lang="en-US" i="1" dirty="0" smtClean="0"/>
+              <a:rPr lang="en-US" u="sng" dirty="0" smtClean="0"/>
               <a:t> </a:t>
             </a:r>
           </a:p>
           <a:p>
-            <a:pPr lvl="0"/>
             <a:r>
               <a:rPr lang="en-US" dirty="0" smtClean="0"/>
-              <a:t> Second </a:t>
-            </a:r>
-            <a:r>
-              <a:rPr lang="en-US" dirty="0"/>
-              <a:t>round completed along with integration tests</a:t>
-            </a:r>
-          </a:p>
-          <a:p>
-            <a:pPr lvl="0"/>
+              <a:t> Complete Project Database</a:t>
+            </a:r>
+          </a:p>
+          <a:p>
             <a:r>
               <a:rPr lang="en-US" dirty="0" smtClean="0"/>
-              <a:t> Finish </a:t>
-            </a:r>
-            <a:r>
-              <a:rPr lang="en-US" dirty="0"/>
-              <a:t>unit/integration/end-to-end tests </a:t>
-            </a:r>
+              <a:t> Upload to database via prototype</a:t>
+            </a:r>
+          </a:p>
+          <a:p>
             <a:r>
               <a:rPr lang="en-US" dirty="0" smtClean="0"/>
-              <a:t>and complete </a:t>
-            </a:r>
-            <a:r>
-              <a:rPr lang="en-US" dirty="0"/>
-              <a:t>testing</a:t>
-            </a:r>
-          </a:p>
-          <a:p>
-            <a:pPr marL="0" indent="0">
-              <a:buNone/>
-            </a:pPr>
+              <a:t> Website Skeleton Complete</a:t>
+            </a:r>
+          </a:p>
+          <a:p>
+            <a:r>
+              <a:rPr lang="en-US" dirty="0" smtClean="0"/>
+              <a:t> Complete Documents</a:t>
+            </a:r>
+          </a:p>
+          <a:p>
+            <a:r>
+              <a:rPr lang="en-US" dirty="0" smtClean="0"/>
+              <a:t> Begin Unit test development   </a:t>
+            </a:r>
             <a:endParaRPr lang="en-US" dirty="0"/>
           </a:p>
         </p:txBody>
@@ -5749,7 +5739,7 @@
     </p:spTree>
     <p:extLst>
       <p:ext uri="{BB962C8B-B14F-4D97-AF65-F5344CB8AC3E}">
-        <p14:creationId xmlns:p14="http://schemas.microsoft.com/office/powerpoint/2010/main" val="1745824311"/>
+        <p14:creationId xmlns:p14="http://schemas.microsoft.com/office/powerpoint/2010/main" val="2477221972"/>
       </p:ext>
     </p:extLst>
   </p:cSld>
@@ -5793,19 +5783,18 @@
             <p:ph type="title"/>
           </p:nvPr>
         </p:nvSpPr>
-        <p:spPr>
-          <a:xfrm>
-            <a:off x="1095023" y="817583"/>
-            <a:ext cx="6965245" cy="823648"/>
-          </a:xfrm>
-        </p:spPr>
+        <p:spPr/>
         <p:txBody>
           <a:bodyPr/>
           <a:lstStyle/>
           <a:p>
             <a:r>
+              <a:rPr lang="en-US" dirty="0"/>
+              <a:t>Iteration </a:t>
+            </a:r>
+            <a:r>
               <a:rPr lang="en-US" dirty="0" smtClean="0"/>
-              <a:t>Problems Encountered</a:t>
+              <a:t>2</a:t>
             </a:r>
             <a:endParaRPr lang="en-US" dirty="0"/>
           </a:p>
@@ -5823,63 +5812,93 @@
         </p:nvSpPr>
         <p:spPr/>
         <p:txBody>
-          <a:bodyPr/>
-          <a:lstStyle/>
-          <a:p>
+          <a:bodyPr>
+            <a:normAutofit lnSpcReduction="10000"/>
+          </a:bodyPr>
+          <a:lstStyle/>
+          <a:p>
+            <a:pPr lvl="0"/>
             <a:r>
               <a:rPr lang="en-US" dirty="0" smtClean="0"/>
-              <a:t> Difficulties With New </a:t>
-            </a:r>
-            <a:r>
-              <a:rPr lang="en-US" dirty="0"/>
-              <a:t>Technology </a:t>
-            </a:r>
-            <a:endParaRPr lang="en-US" dirty="0" smtClean="0"/>
-          </a:p>
-          <a:p>
-            <a:pPr lvl="1"/>
+              <a:t> </a:t>
+            </a:r>
+            <a:r>
+              <a:rPr lang="en-US" b="1" i="1" dirty="0"/>
+              <a:t>February </a:t>
+            </a:r>
+            <a:r>
+              <a:rPr lang="en-US" b="1" i="1" dirty="0" smtClean="0"/>
+              <a:t>3, </a:t>
+            </a:r>
+            <a:r>
+              <a:rPr lang="en-US" b="1" i="1" dirty="0"/>
+              <a:t>2015</a:t>
+            </a:r>
             <a:r>
               <a:rPr lang="en-US" dirty="0"/>
               <a:t> </a:t>
             </a:r>
             <a:r>
               <a:rPr lang="en-US" dirty="0" smtClean="0"/>
-              <a:t>.NET Framework</a:t>
-            </a:r>
-          </a:p>
-          <a:p>
-            <a:pPr lvl="1"/>
+              <a:t> </a:t>
+            </a:r>
+          </a:p>
+          <a:p>
+            <a:pPr lvl="0"/>
+            <a:r>
+              <a:rPr lang="en-US" dirty="0" smtClean="0"/>
+              <a:t> Web </a:t>
+            </a:r>
             <a:r>
               <a:rPr lang="en-US" dirty="0"/>
-              <a:t> </a:t>
-            </a:r>
-            <a:r>
-              <a:rPr lang="en-US" dirty="0" err="1" smtClean="0"/>
-              <a:t>GitHub</a:t>
-            </a:r>
-            <a:endParaRPr lang="en-US" dirty="0" smtClean="0"/>
-          </a:p>
-          <a:p>
+              <a:t>application completed (including database update mechanism)</a:t>
+            </a:r>
+          </a:p>
+          <a:p>
+            <a:pPr lvl="0"/>
             <a:r>
               <a:rPr lang="en-US" dirty="0" smtClean="0"/>
-              <a:t> Host Verification</a:t>
-            </a:r>
-          </a:p>
-          <a:p>
+              <a:t> Web application unit tests complete</a:t>
+            </a:r>
+            <a:endParaRPr lang="en-US" dirty="0"/>
+          </a:p>
+          <a:p>
+            <a:pPr lvl="0"/>
+            <a:r>
+              <a:rPr lang="en-US" dirty="0" smtClean="0"/>
+              <a:t> Web </a:t>
+            </a:r>
             <a:r>
               <a:rPr lang="en-US" dirty="0"/>
-              <a:t> </a:t>
-            </a:r>
+              <a:t>application integration test development has begun</a:t>
+            </a:r>
+          </a:p>
+          <a:p>
+            <a:pPr lvl="0"/>
             <a:r>
               <a:rPr lang="en-US" dirty="0" smtClean="0"/>
-              <a:t>Miscommunication</a:t>
-            </a:r>
-          </a:p>
-          <a:p>
+              <a:t> Website </a:t>
+            </a:r>
+            <a:r>
+              <a:rPr lang="en-US" dirty="0"/>
+              <a:t>design finalized</a:t>
+            </a:r>
+          </a:p>
+          <a:p>
+            <a:pPr lvl="0"/>
             <a:r>
               <a:rPr lang="en-US" dirty="0" smtClean="0"/>
-              <a:t> Scheduling</a:t>
-            </a:r>
+              <a:t> First </a:t>
+            </a:r>
+            <a:r>
+              <a:rPr lang="en-US" dirty="0"/>
+              <a:t>round of analytics prototyped along with beginning unit tests</a:t>
+            </a:r>
+          </a:p>
+          <a:p>
+            <a:pPr marL="0" indent="0">
+              <a:buNone/>
+            </a:pPr>
             <a:endParaRPr lang="en-US" dirty="0"/>
           </a:p>
         </p:txBody>
@@ -5887,7 +5906,7 @@
     </p:spTree>
     <p:extLst>
       <p:ext uri="{BB962C8B-B14F-4D97-AF65-F5344CB8AC3E}">
-        <p14:creationId xmlns:p14="http://schemas.microsoft.com/office/powerpoint/2010/main" val="1395202406"/>
+        <p14:creationId xmlns:p14="http://schemas.microsoft.com/office/powerpoint/2010/main" val="3369431712"/>
       </p:ext>
     </p:extLst>
   </p:cSld>
@@ -5921,192 +5940,97 @@
           <a:chExt cx="0" cy="0"/>
         </a:xfrm>
       </p:grpSpPr>
-      <p:graphicFrame>
-        <p:nvGraphicFramePr>
-          <p:cNvPr id="2" name="Object 1"/>
-          <p:cNvGraphicFramePr>
-            <a:graphicFrameLocks noChangeAspect="1"/>
-          </p:cNvGraphicFramePr>
-          <p:nvPr>
-            <p:extLst>
-              <p:ext uri="{D42A27DB-BD31-4B8C-83A1-F6EECF244321}">
-                <p14:modId xmlns:p14="http://schemas.microsoft.com/office/powerpoint/2010/main" val="3523488162"/>
-              </p:ext>
-            </p:extLst>
-          </p:nvPr>
-        </p:nvGraphicFramePr>
-        <p:xfrm>
-          <a:off x="1355720" y="2560334"/>
-          <a:ext cx="3021013" cy="2743200"/>
-        </p:xfrm>
-        <a:graphic>
-          <a:graphicData uri="http://schemas.openxmlformats.org/presentationml/2006/ole">
-            <mc:AlternateContent xmlns:mc="http://schemas.openxmlformats.org/markup-compatibility/2006">
-              <mc:Choice xmlns:v="urn:schemas-microsoft-com:vml" Requires="v">
-                <p:oleObj spid="_x0000_s1057" r:id="rId3" imgW="3035300" imgH="2755900" progId="">
-                  <p:embed/>
-                </p:oleObj>
-              </mc:Choice>
-              <mc:Fallback>
-                <p:oleObj r:id="rId3" imgW="3035300" imgH="2755900" progId="">
-                  <p:embed/>
-                  <p:pic>
-                    <p:nvPicPr>
-                      <p:cNvPr id="0" name="Object 1"/>
-                      <p:cNvPicPr>
-                        <a:picLocks noChangeAspect="1" noChangeArrowheads="1"/>
-                      </p:cNvPicPr>
-                      <p:nvPr/>
-                    </p:nvPicPr>
-                    <p:blipFill>
-                      <a:blip r:embed="rId4">
-                        <a:extLst>
-                          <a:ext uri="{28A0092B-C50C-407E-A947-70E740481C1C}">
-                            <a14:useLocalDpi xmlns:a14="http://schemas.microsoft.com/office/drawing/2010/main" val="0"/>
-                          </a:ext>
-                        </a:extLst>
-                      </a:blip>
-                      <a:srcRect/>
-                      <a:stretch>
-                        <a:fillRect/>
-                      </a:stretch>
-                    </p:blipFill>
-                    <p:spPr bwMode="auto">
-                      <a:xfrm>
-                        <a:off x="1355720" y="2560334"/>
-                        <a:ext cx="3021013" cy="2743200"/>
-                      </a:xfrm>
-                      <a:prstGeom prst="rect">
-                        <a:avLst/>
-                      </a:prstGeom>
-                      <a:noFill/>
-                      <a:extLst>
-                        <a:ext uri="{909E8E84-426E-40dd-AFC4-6F175D3DCCD1}">
-                          <a14:hiddenFill xmlns:a14="http://schemas.microsoft.com/office/drawing/2010/main">
-                            <a:solidFill>
-                              <a:srgbClr val="FFFFFF"/>
-                            </a:solidFill>
-                          </a14:hiddenFill>
-                        </a:ext>
-                      </a:extLst>
-                    </p:spPr>
-                  </p:pic>
-                </p:oleObj>
-              </mc:Fallback>
-            </mc:AlternateContent>
-          </a:graphicData>
-        </a:graphic>
-      </p:graphicFrame>
-      <p:graphicFrame>
-        <p:nvGraphicFramePr>
-          <p:cNvPr id="3" name="Object 2"/>
-          <p:cNvGraphicFramePr>
-            <a:graphicFrameLocks noChangeAspect="1"/>
-          </p:cNvGraphicFramePr>
-          <p:nvPr>
-            <p:extLst>
-              <p:ext uri="{D42A27DB-BD31-4B8C-83A1-F6EECF244321}">
-                <p14:modId xmlns:p14="http://schemas.microsoft.com/office/powerpoint/2010/main" val="1351596661"/>
-              </p:ext>
-            </p:extLst>
-          </p:nvPr>
-        </p:nvGraphicFramePr>
-        <p:xfrm>
-          <a:off x="4739129" y="2000293"/>
-          <a:ext cx="3290887" cy="3886200"/>
-        </p:xfrm>
-        <a:graphic>
-          <a:graphicData uri="http://schemas.openxmlformats.org/presentationml/2006/ole">
-            <mc:AlternateContent xmlns:mc="http://schemas.openxmlformats.org/markup-compatibility/2006">
-              <mc:Choice xmlns:v="urn:schemas-microsoft-com:vml" Requires="v">
-                <p:oleObj spid="_x0000_s1058" r:id="rId5" imgW="3302000" imgH="3898900" progId="">
-                  <p:embed/>
-                </p:oleObj>
-              </mc:Choice>
-              <mc:Fallback>
-                <p:oleObj r:id="rId5" imgW="3302000" imgH="3898900" progId="">
-                  <p:embed/>
-                  <p:pic>
-                    <p:nvPicPr>
-                      <p:cNvPr id="0" name="Object 2"/>
-                      <p:cNvPicPr>
-                        <a:picLocks noChangeAspect="1" noChangeArrowheads="1"/>
-                      </p:cNvPicPr>
-                      <p:nvPr/>
-                    </p:nvPicPr>
-                    <p:blipFill>
-                      <a:blip r:embed="rId6">
-                        <a:extLst>
-                          <a:ext uri="{28A0092B-C50C-407E-A947-70E740481C1C}">
-                            <a14:useLocalDpi xmlns:a14="http://schemas.microsoft.com/office/drawing/2010/main" val="0"/>
-                          </a:ext>
-                        </a:extLst>
-                      </a:blip>
-                      <a:srcRect/>
-                      <a:stretch>
-                        <a:fillRect/>
-                      </a:stretch>
-                    </p:blipFill>
-                    <p:spPr bwMode="auto">
-                      <a:xfrm>
-                        <a:off x="4739129" y="2000293"/>
-                        <a:ext cx="3290887" cy="3886200"/>
-                      </a:xfrm>
-                      <a:prstGeom prst="rect">
-                        <a:avLst/>
-                      </a:prstGeom>
-                      <a:noFill/>
-                      <a:extLst>
-                        <a:ext uri="{909E8E84-426E-40dd-AFC4-6F175D3DCCD1}">
-                          <a14:hiddenFill xmlns:a14="http://schemas.microsoft.com/office/drawing/2010/main">
-                            <a:solidFill>
-                              <a:srgbClr val="FFFFFF"/>
-                            </a:solidFill>
-                          </a14:hiddenFill>
-                        </a:ext>
-                      </a:extLst>
-                    </p:spPr>
-                  </p:pic>
-                </p:oleObj>
-              </mc:Fallback>
-            </mc:AlternateContent>
-          </a:graphicData>
-        </a:graphic>
-      </p:graphicFrame>
-      <p:sp>
-        <p:nvSpPr>
-          <p:cNvPr id="4" name="TextBox 3"/>
-          <p:cNvSpPr txBox="1"/>
-          <p:nvPr/>
-        </p:nvSpPr>
-        <p:spPr>
-          <a:xfrm>
-            <a:off x="1355720" y="997970"/>
-            <a:ext cx="1763323" cy="523220"/>
-          </a:xfrm>
-          <a:prstGeom prst="rect">
-            <a:avLst/>
-          </a:prstGeom>
-          <a:noFill/>
-        </p:spPr>
-        <p:txBody>
-          <a:bodyPr wrap="none" rtlCol="0">
-            <a:spAutoFit/>
-          </a:bodyPr>
-          <a:lstStyle/>
-          <a:p>
-            <a:r>
-              <a:rPr lang="en-US" sz="2800" dirty="0" smtClean="0"/>
-              <a:t>Use Cases</a:t>
-            </a:r>
-            <a:endParaRPr lang="en-US" sz="2800" dirty="0"/>
+      <p:sp>
+        <p:nvSpPr>
+          <p:cNvPr id="2" name="Title 1"/>
+          <p:cNvSpPr>
+            <a:spLocks noGrp="1"/>
+          </p:cNvSpPr>
+          <p:nvPr>
+            <p:ph type="title"/>
+          </p:nvPr>
+        </p:nvSpPr>
+        <p:spPr/>
+        <p:txBody>
+          <a:bodyPr/>
+          <a:lstStyle/>
+          <a:p>
+            <a:r>
+              <a:rPr lang="en-US" dirty="0"/>
+              <a:t>Iteration </a:t>
+            </a:r>
+            <a:r>
+              <a:rPr lang="en-US" dirty="0" smtClean="0"/>
+              <a:t>3</a:t>
+            </a:r>
+            <a:endParaRPr lang="en-US" dirty="0"/>
+          </a:p>
+        </p:txBody>
+      </p:sp>
+      <p:sp>
+        <p:nvSpPr>
+          <p:cNvPr id="3" name="Content Placeholder 2"/>
+          <p:cNvSpPr>
+            <a:spLocks noGrp="1"/>
+          </p:cNvSpPr>
+          <p:nvPr>
+            <p:ph idx="1"/>
+          </p:nvPr>
+        </p:nvSpPr>
+        <p:spPr/>
+        <p:txBody>
+          <a:bodyPr/>
+          <a:lstStyle/>
+          <a:p>
+            <a:pPr lvl="0"/>
+            <a:r>
+              <a:rPr lang="en-US" dirty="0" smtClean="0"/>
+              <a:t> </a:t>
+            </a:r>
+            <a:r>
+              <a:rPr lang="en-US" b="1" i="1" dirty="0"/>
+              <a:t>March 8, 2015</a:t>
+            </a:r>
+            <a:r>
+              <a:rPr lang="en-US" dirty="0"/>
+              <a:t> </a:t>
+            </a:r>
+            <a:r>
+              <a:rPr lang="en-US" dirty="0" smtClean="0"/>
+              <a:t> </a:t>
+            </a:r>
+          </a:p>
+          <a:p>
+            <a:pPr lvl="0"/>
+            <a:r>
+              <a:rPr lang="en-US" dirty="0" smtClean="0"/>
+              <a:t> Second </a:t>
+            </a:r>
+            <a:r>
+              <a:rPr lang="en-US" dirty="0"/>
+              <a:t>round of analytics prototyped along with beginning unit tests</a:t>
+            </a:r>
+          </a:p>
+          <a:p>
+            <a:pPr lvl="0"/>
+            <a:r>
+              <a:rPr lang="en-US" dirty="0" smtClean="0"/>
+              <a:t> First </a:t>
+            </a:r>
+            <a:r>
+              <a:rPr lang="en-US" dirty="0"/>
+              <a:t>round of analytics finalized along with integration tests</a:t>
+            </a:r>
+          </a:p>
+          <a:p>
+            <a:endParaRPr lang="en-US" dirty="0"/>
           </a:p>
         </p:txBody>
       </p:sp>
     </p:spTree>
     <p:extLst>
       <p:ext uri="{BB962C8B-B14F-4D97-AF65-F5344CB8AC3E}">
-        <p14:creationId xmlns:p14="http://schemas.microsoft.com/office/powerpoint/2010/main" val="476663040"/>
+        <p14:creationId xmlns:p14="http://schemas.microsoft.com/office/powerpoint/2010/main" val="2766940533"/>
       </p:ext>
     </p:extLst>
   </p:cSld>
@@ -6142,68 +6066,106 @@
       </p:grpSpPr>
       <p:sp>
         <p:nvSpPr>
-          <p:cNvPr id="3" name="TextBox 2"/>
-          <p:cNvSpPr txBox="1"/>
-          <p:nvPr/>
-        </p:nvSpPr>
-        <p:spPr>
-          <a:xfrm>
-            <a:off x="958600" y="714732"/>
-            <a:ext cx="3142006" cy="584776"/>
-          </a:xfrm>
-          <a:prstGeom prst="rect">
-            <a:avLst/>
-          </a:prstGeom>
-          <a:noFill/>
-        </p:spPr>
-        <p:txBody>
-          <a:bodyPr wrap="none" rtlCol="0">
-            <a:spAutoFit/>
-          </a:bodyPr>
-          <a:lstStyle/>
-          <a:p>
-            <a:r>
-              <a:rPr lang="en-US" sz="3200" dirty="0" smtClean="0"/>
-              <a:t>Database Design</a:t>
-            </a:r>
-            <a:endParaRPr lang="en-US" sz="3200" dirty="0"/>
-          </a:p>
-        </p:txBody>
-      </p:sp>
-      <p:pic>
-        <p:nvPicPr>
-          <p:cNvPr id="4" name="Picture 3" descr="Screen Shot 2015-01-28 at 6.45.57 PM.png"/>
-          <p:cNvPicPr>
-            <a:picLocks noChangeAspect="1"/>
-          </p:cNvPicPr>
-          <p:nvPr/>
-        </p:nvPicPr>
-        <p:blipFill>
-          <a:blip r:embed="rId2">
-            <a:extLst>
-              <a:ext uri="{28A0092B-C50C-407E-A947-70E740481C1C}">
-                <a14:useLocalDpi xmlns:a14="http://schemas.microsoft.com/office/drawing/2010/main" val="0"/>
-              </a:ext>
-            </a:extLst>
-          </a:blip>
-          <a:stretch>
-            <a:fillRect/>
-          </a:stretch>
-        </p:blipFill>
-        <p:spPr>
-          <a:xfrm>
-            <a:off x="429846" y="117230"/>
-            <a:ext cx="8225692" cy="6389078"/>
-          </a:xfrm>
-          <a:prstGeom prst="rect">
-            <a:avLst/>
-          </a:prstGeom>
-        </p:spPr>
-      </p:pic>
+          <p:cNvPr id="2" name="Title 1"/>
+          <p:cNvSpPr>
+            <a:spLocks noGrp="1"/>
+          </p:cNvSpPr>
+          <p:nvPr>
+            <p:ph type="title"/>
+          </p:nvPr>
+        </p:nvSpPr>
+        <p:spPr/>
+        <p:txBody>
+          <a:bodyPr/>
+          <a:lstStyle/>
+          <a:p>
+            <a:r>
+              <a:rPr lang="en-US" dirty="0"/>
+              <a:t>Iteration </a:t>
+            </a:r>
+            <a:r>
+              <a:rPr lang="en-US" dirty="0" smtClean="0"/>
+              <a:t>4</a:t>
+            </a:r>
+            <a:endParaRPr lang="en-US" dirty="0"/>
+          </a:p>
+        </p:txBody>
+      </p:sp>
+      <p:sp>
+        <p:nvSpPr>
+          <p:cNvPr id="3" name="Content Placeholder 2"/>
+          <p:cNvSpPr>
+            <a:spLocks noGrp="1"/>
+          </p:cNvSpPr>
+          <p:nvPr>
+            <p:ph idx="1"/>
+          </p:nvPr>
+        </p:nvSpPr>
+        <p:spPr/>
+        <p:txBody>
+          <a:bodyPr/>
+          <a:lstStyle/>
+          <a:p>
+            <a:pPr lvl="0"/>
+            <a:r>
+              <a:rPr lang="en-US" dirty="0" smtClean="0"/>
+              <a:t> </a:t>
+            </a:r>
+            <a:r>
+              <a:rPr lang="en-US" b="1" i="1" dirty="0"/>
+              <a:t>April 8, 2015</a:t>
+            </a:r>
+            <a:r>
+              <a:rPr lang="en-US" i="1" dirty="0"/>
+              <a:t> </a:t>
+            </a:r>
+            <a:r>
+              <a:rPr lang="en-US" i="1" dirty="0" smtClean="0"/>
+              <a:t> </a:t>
+            </a:r>
+          </a:p>
+          <a:p>
+            <a:pPr lvl="0"/>
+            <a:r>
+              <a:rPr lang="en-US" dirty="0" smtClean="0"/>
+              <a:t> Second </a:t>
+            </a:r>
+            <a:r>
+              <a:rPr lang="en-US" dirty="0"/>
+              <a:t>round completed along with integration tests</a:t>
+            </a:r>
+          </a:p>
+          <a:p>
+            <a:pPr lvl="0"/>
+            <a:r>
+              <a:rPr lang="en-US" dirty="0" smtClean="0"/>
+              <a:t> Finish </a:t>
+            </a:r>
+            <a:r>
+              <a:rPr lang="en-US" dirty="0"/>
+              <a:t>unit/integration/end-to-end tests </a:t>
+            </a:r>
+            <a:r>
+              <a:rPr lang="en-US" dirty="0" smtClean="0"/>
+              <a:t>and complete </a:t>
+            </a:r>
+            <a:r>
+              <a:rPr lang="en-US" dirty="0"/>
+              <a:t>testing</a:t>
+            </a:r>
+          </a:p>
+          <a:p>
+            <a:pPr marL="0" indent="0">
+              <a:buNone/>
+            </a:pPr>
+            <a:endParaRPr lang="en-US" dirty="0"/>
+          </a:p>
+        </p:txBody>
+      </p:sp>
     </p:spTree>
     <p:extLst>
       <p:ext uri="{BB962C8B-B14F-4D97-AF65-F5344CB8AC3E}">
-        <p14:creationId xmlns:p14="http://schemas.microsoft.com/office/powerpoint/2010/main" val="246278495"/>
+        <p14:creationId xmlns:p14="http://schemas.microsoft.com/office/powerpoint/2010/main" val="1745824311"/>
       </p:ext>
     </p:extLst>
   </p:cSld>
@@ -6239,68 +6201,109 @@
       </p:grpSpPr>
       <p:sp>
         <p:nvSpPr>
-          <p:cNvPr id="12" name="TextBox 11"/>
-          <p:cNvSpPr txBox="1"/>
-          <p:nvPr/>
+          <p:cNvPr id="2" name="Title 1"/>
+          <p:cNvSpPr>
+            <a:spLocks noGrp="1"/>
+          </p:cNvSpPr>
+          <p:nvPr>
+            <p:ph type="title"/>
+          </p:nvPr>
         </p:nvSpPr>
         <p:spPr>
           <a:xfrm>
-            <a:off x="1083077" y="710094"/>
-            <a:ext cx="2901300" cy="461665"/>
+            <a:off x="1095023" y="817583"/>
+            <a:ext cx="6965245" cy="823648"/>
           </a:xfrm>
-          <a:prstGeom prst="rect">
-            <a:avLst/>
-          </a:prstGeom>
-          <a:noFill/>
         </p:spPr>
         <p:txBody>
-          <a:bodyPr wrap="square" rtlCol="0">
-            <a:spAutoFit/>
-          </a:bodyPr>
-          <a:lstStyle/>
-          <a:p>
-            <a:r>
-              <a:rPr lang="en-US" sz="2400" dirty="0" smtClean="0"/>
-              <a:t>System Architecture</a:t>
-            </a:r>
-            <a:endParaRPr lang="en-US" sz="2400" dirty="0"/>
-          </a:p>
-        </p:txBody>
-      </p:sp>
-      <p:pic>
-        <p:nvPicPr>
-          <p:cNvPr id="2" name="Picture 1" descr="Screen Shot 2015-02-01 at 2.36.04 PM.png"/>
-          <p:cNvPicPr>
-            <a:picLocks noChangeAspect="1"/>
-          </p:cNvPicPr>
-          <p:nvPr/>
-        </p:nvPicPr>
-        <p:blipFill>
-          <a:blip r:embed="rId2">
-            <a:extLst>
-              <a:ext uri="{28A0092B-C50C-407E-A947-70E740481C1C}">
-                <a14:useLocalDpi xmlns:a14="http://schemas.microsoft.com/office/drawing/2010/main" val="0"/>
-              </a:ext>
-            </a:extLst>
-          </a:blip>
-          <a:stretch>
-            <a:fillRect/>
-          </a:stretch>
-        </p:blipFill>
-        <p:spPr>
-          <a:xfrm>
-            <a:off x="995154" y="1171759"/>
-            <a:ext cx="7129337" cy="5026543"/>
-          </a:xfrm>
-          <a:prstGeom prst="rect">
-            <a:avLst/>
-          </a:prstGeom>
-        </p:spPr>
-      </p:pic>
+          <a:bodyPr/>
+          <a:lstStyle/>
+          <a:p>
+            <a:r>
+              <a:rPr lang="en-US" dirty="0" smtClean="0"/>
+              <a:t>Problems Encountered</a:t>
+            </a:r>
+            <a:endParaRPr lang="en-US" dirty="0"/>
+          </a:p>
+        </p:txBody>
+      </p:sp>
+      <p:sp>
+        <p:nvSpPr>
+          <p:cNvPr id="3" name="Content Placeholder 2"/>
+          <p:cNvSpPr>
+            <a:spLocks noGrp="1"/>
+          </p:cNvSpPr>
+          <p:nvPr>
+            <p:ph idx="1"/>
+          </p:nvPr>
+        </p:nvSpPr>
+        <p:spPr/>
+        <p:txBody>
+          <a:bodyPr/>
+          <a:lstStyle/>
+          <a:p>
+            <a:r>
+              <a:rPr lang="en-US" dirty="0" smtClean="0"/>
+              <a:t> Difficulties With New </a:t>
+            </a:r>
+            <a:r>
+              <a:rPr lang="en-US" dirty="0"/>
+              <a:t>Technology </a:t>
+            </a:r>
+            <a:endParaRPr lang="en-US" dirty="0" smtClean="0"/>
+          </a:p>
+          <a:p>
+            <a:pPr lvl="1"/>
+            <a:r>
+              <a:rPr lang="en-US" dirty="0"/>
+              <a:t> </a:t>
+            </a:r>
+            <a:r>
+              <a:rPr lang="en-US" dirty="0" smtClean="0"/>
+              <a:t>.NET Framework</a:t>
+            </a:r>
+          </a:p>
+          <a:p>
+            <a:pPr lvl="1"/>
+            <a:r>
+              <a:rPr lang="en-US" dirty="0"/>
+              <a:t> </a:t>
+            </a:r>
+            <a:r>
+              <a:rPr lang="en-US" dirty="0" err="1" smtClean="0"/>
+              <a:t>GitHub</a:t>
+            </a:r>
+            <a:endParaRPr lang="en-US" dirty="0" smtClean="0"/>
+          </a:p>
+          <a:p>
+            <a:r>
+              <a:rPr lang="en-US" dirty="0" smtClean="0"/>
+              <a:t> Host Verification</a:t>
+            </a:r>
+          </a:p>
+          <a:p>
+            <a:r>
+              <a:rPr lang="en-US" dirty="0"/>
+              <a:t> </a:t>
+            </a:r>
+            <a:r>
+              <a:rPr lang="en-US" dirty="0" smtClean="0"/>
+              <a:t>Miscommunication</a:t>
+            </a:r>
+          </a:p>
+          <a:p>
+            <a:r>
+              <a:rPr lang="en-US" dirty="0" smtClean="0"/>
+              <a:t> Scheduling</a:t>
+            </a:r>
+            <a:endParaRPr lang="en-US" dirty="0"/>
+          </a:p>
+        </p:txBody>
+      </p:sp>
     </p:spTree>
     <p:extLst>
       <p:ext uri="{BB962C8B-B14F-4D97-AF65-F5344CB8AC3E}">
-        <p14:creationId xmlns:p14="http://schemas.microsoft.com/office/powerpoint/2010/main" val="2405123399"/>
+        <p14:creationId xmlns:p14="http://schemas.microsoft.com/office/powerpoint/2010/main" val="1395202406"/>
       </p:ext>
     </p:extLst>
   </p:cSld>
@@ -6714,15 +6717,7 @@
             </a:r>
             <a:r>
               <a:rPr lang="en-US" dirty="0" smtClean="0"/>
-              <a:t>An </a:t>
-            </a:r>
-            <a:r>
-              <a:rPr lang="en-US" dirty="0" smtClean="0"/>
-              <a:t>CakePHP Web </a:t>
-            </a:r>
-            <a:r>
-              <a:rPr lang="en-US" dirty="0" smtClean="0"/>
-              <a:t>application which interfaces with the database and allows users to search, analyze, and maintain it</a:t>
+              <a:t>An CakePHP Web application which interfaces with the database and allows users to search, analyze, and maintain it</a:t>
             </a:r>
           </a:p>
         </p:txBody>
@@ -6766,167 +6761,68 @@
       </p:grpSpPr>
       <p:sp>
         <p:nvSpPr>
-          <p:cNvPr id="8" name="Title 7"/>
-          <p:cNvSpPr>
-            <a:spLocks noGrp="1"/>
-          </p:cNvSpPr>
-          <p:nvPr>
-            <p:ph type="title"/>
-          </p:nvPr>
-        </p:nvSpPr>
-        <p:spPr/>
-        <p:txBody>
-          <a:bodyPr/>
-          <a:lstStyle/>
-          <a:p>
-            <a:r>
-              <a:rPr lang="en-US" dirty="0"/>
-              <a:t>Technologies Used</a:t>
-            </a:r>
-          </a:p>
-        </p:txBody>
-      </p:sp>
-      <p:sp>
-        <p:nvSpPr>
-          <p:cNvPr id="9" name="Content Placeholder 8"/>
-          <p:cNvSpPr>
-            <a:spLocks noGrp="1"/>
-          </p:cNvSpPr>
-          <p:nvPr>
-            <p:ph sz="quarter" idx="13"/>
-          </p:nvPr>
+          <p:cNvPr id="12" name="TextBox 11"/>
+          <p:cNvSpPr txBox="1"/>
+          <p:nvPr/>
         </p:nvSpPr>
         <p:spPr>
           <a:xfrm>
-            <a:off x="956524" y="2111028"/>
-            <a:ext cx="3556861" cy="3602736"/>
+            <a:off x="1083077" y="710094"/>
+            <a:ext cx="2901300" cy="461665"/>
           </a:xfrm>
+          <a:prstGeom prst="rect">
+            <a:avLst/>
+          </a:prstGeom>
+          <a:noFill/>
         </p:spPr>
         <p:txBody>
-          <a:bodyPr/>
-          <a:lstStyle/>
-          <a:p>
-            <a:r>
-              <a:rPr lang="en-US" dirty="0" smtClean="0"/>
-              <a:t> </a:t>
-            </a:r>
-            <a:r>
-              <a:rPr lang="en-US" b="1" u="sng" dirty="0" smtClean="0"/>
-              <a:t>Database</a:t>
-            </a:r>
-          </a:p>
-          <a:p>
-            <a:pPr lvl="1"/>
-            <a:r>
-              <a:rPr lang="en-US" dirty="0"/>
-              <a:t> </a:t>
-            </a:r>
-            <a:r>
-              <a:rPr lang="en-US" dirty="0" smtClean="0"/>
-              <a:t>MySQL 5</a:t>
-            </a:r>
-          </a:p>
-          <a:p>
-            <a:pPr lvl="1"/>
-            <a:r>
-              <a:rPr lang="en-US" dirty="0"/>
-              <a:t> </a:t>
-            </a:r>
-            <a:r>
-              <a:rPr lang="en-US" dirty="0" smtClean="0"/>
-              <a:t>MySQL Workbench 6.2</a:t>
-            </a:r>
-          </a:p>
-          <a:p>
-            <a:pPr lvl="1"/>
-            <a:r>
-              <a:rPr lang="en-US" dirty="0"/>
-              <a:t> </a:t>
-            </a:r>
-            <a:r>
-              <a:rPr lang="en-US" dirty="0" err="1" smtClean="0"/>
-              <a:t>phpMyAdmin</a:t>
-            </a:r>
-            <a:r>
-              <a:rPr lang="en-US" dirty="0" smtClean="0"/>
-              <a:t> 4</a:t>
-            </a:r>
-          </a:p>
-          <a:p>
-            <a:pPr lvl="1"/>
-            <a:endParaRPr lang="en-US" dirty="0" smtClean="0"/>
-          </a:p>
-          <a:p>
-            <a:pPr lvl="1"/>
-            <a:endParaRPr lang="en-US" dirty="0"/>
-          </a:p>
-        </p:txBody>
-      </p:sp>
-      <p:sp>
-        <p:nvSpPr>
-          <p:cNvPr id="10" name="Content Placeholder 9"/>
-          <p:cNvSpPr>
-            <a:spLocks noGrp="1"/>
-          </p:cNvSpPr>
-          <p:nvPr>
-            <p:ph sz="quarter" idx="14"/>
-          </p:nvPr>
-        </p:nvSpPr>
-        <p:spPr/>
-        <p:txBody>
-          <a:bodyPr/>
-          <a:lstStyle/>
-          <a:p>
-            <a:r>
-              <a:rPr lang="en-US" dirty="0" smtClean="0"/>
-              <a:t> </a:t>
-            </a:r>
-            <a:r>
-              <a:rPr lang="en-US" b="1" u="sng" dirty="0" smtClean="0"/>
-              <a:t>Web Application</a:t>
-            </a:r>
-          </a:p>
-          <a:p>
-            <a:pPr lvl="1"/>
-            <a:r>
-              <a:rPr lang="en-US" dirty="0" smtClean="0"/>
-              <a:t> </a:t>
-            </a:r>
-            <a:r>
-              <a:rPr lang="en-US" dirty="0" smtClean="0"/>
-              <a:t>CakePHP 2.6.1</a:t>
-            </a:r>
-            <a:endParaRPr lang="en-US" dirty="0" smtClean="0"/>
-          </a:p>
-          <a:p>
-            <a:pPr lvl="1"/>
-            <a:r>
-              <a:rPr lang="en-US" dirty="0"/>
-              <a:t> </a:t>
-            </a:r>
-            <a:r>
-              <a:rPr lang="en-US" dirty="0" smtClean="0"/>
-              <a:t>Microsoft IIS</a:t>
-            </a:r>
-          </a:p>
-          <a:p>
-            <a:pPr lvl="1"/>
-            <a:r>
-              <a:rPr lang="en-US" dirty="0" smtClean="0"/>
-              <a:t> </a:t>
-            </a:r>
-            <a:r>
-              <a:rPr lang="en-US" dirty="0" err="1" smtClean="0"/>
-              <a:t>GitHub</a:t>
-            </a:r>
-            <a:endParaRPr lang="en-US" dirty="0"/>
-          </a:p>
-        </p:txBody>
-      </p:sp>
+          <a:bodyPr wrap="square" rtlCol="0">
+            <a:spAutoFit/>
+          </a:bodyPr>
+          <a:lstStyle/>
+          <a:p>
+            <a:r>
+              <a:rPr lang="en-US" sz="2400" dirty="0" smtClean="0"/>
+              <a:t>System Architecture</a:t>
+            </a:r>
+            <a:endParaRPr lang="en-US" sz="2400" dirty="0"/>
+          </a:p>
+        </p:txBody>
+      </p:sp>
+      <p:pic>
+        <p:nvPicPr>
+          <p:cNvPr id="2" name="Picture 1" descr="Screen Shot 2015-02-01 at 2.36.04 PM.png"/>
+          <p:cNvPicPr>
+            <a:picLocks noChangeAspect="1"/>
+          </p:cNvPicPr>
+          <p:nvPr/>
+        </p:nvPicPr>
+        <p:blipFill>
+          <a:blip r:embed="rId2">
+            <a:extLst>
+              <a:ext uri="{28A0092B-C50C-407E-A947-70E740481C1C}">
+                <a14:useLocalDpi xmlns:a14="http://schemas.microsoft.com/office/drawing/2010/main" val="0"/>
+              </a:ext>
+            </a:extLst>
+          </a:blip>
+          <a:stretch>
+            <a:fillRect/>
+          </a:stretch>
+        </p:blipFill>
+        <p:spPr>
+          <a:xfrm>
+            <a:off x="995154" y="1171759"/>
+            <a:ext cx="7129337" cy="5026543"/>
+          </a:xfrm>
+          <a:prstGeom prst="rect">
+            <a:avLst/>
+          </a:prstGeom>
+        </p:spPr>
+      </p:pic>
     </p:spTree>
     <p:extLst>
       <p:ext uri="{BB962C8B-B14F-4D97-AF65-F5344CB8AC3E}">
-        <p14:creationId xmlns:p14="http://schemas.microsoft.com/office/powerpoint/2010/main" val="4133639271"/>
+        <p14:creationId xmlns:p14="http://schemas.microsoft.com/office/powerpoint/2010/main" val="2405123399"/>
       </p:ext>
     </p:extLst>
   </p:cSld>
@@ -6944,7 +6840,7 @@
 </file>
 
 <file path=ppt/slides/slide6.xml><?xml version="1.0" encoding="utf-8"?>
-<p:sld xmlns:a="http://schemas.openxmlformats.org/drawingml/2006/main" xmlns:r="http://schemas.openxmlformats.org/officeDocument/2006/relationships" xmlns:p="http://schemas.openxmlformats.org/presentationml/2006/main" show="0">
+<p:sld xmlns:a="http://schemas.openxmlformats.org/drawingml/2006/main" xmlns:r="http://schemas.openxmlformats.org/officeDocument/2006/relationships" xmlns:p="http://schemas.openxmlformats.org/presentationml/2006/main">
   <p:cSld>
     <p:spTree>
       <p:nvGrpSpPr>
@@ -6962,98 +6858,74 @@
       </p:grpSpPr>
       <p:sp>
         <p:nvSpPr>
-          <p:cNvPr id="2" name="Title 1"/>
-          <p:cNvSpPr>
-            <a:spLocks noGrp="1"/>
-          </p:cNvSpPr>
-          <p:nvPr>
-            <p:ph type="title"/>
-          </p:nvPr>
-        </p:nvSpPr>
-        <p:spPr/>
-        <p:txBody>
-          <a:bodyPr/>
-          <a:lstStyle/>
-          <a:p>
-            <a:r>
-              <a:rPr lang="en-US" dirty="0" smtClean="0"/>
-              <a:t>Goals For Break</a:t>
-            </a:r>
-            <a:endParaRPr lang="en-US" dirty="0"/>
-          </a:p>
-        </p:txBody>
-      </p:sp>
-      <p:sp>
-        <p:nvSpPr>
-          <p:cNvPr id="3" name="Content Placeholder 2"/>
-          <p:cNvSpPr>
-            <a:spLocks noGrp="1"/>
-          </p:cNvSpPr>
-          <p:nvPr>
-            <p:ph idx="1"/>
-          </p:nvPr>
-        </p:nvSpPr>
-        <p:spPr/>
-        <p:txBody>
-          <a:bodyPr/>
-          <a:lstStyle/>
-          <a:p>
-            <a:r>
-              <a:rPr lang="en-US" dirty="0" smtClean="0"/>
-              <a:t> Learn Unit Testing Methodologies</a:t>
-            </a:r>
-          </a:p>
-          <a:p>
-            <a:r>
-              <a:rPr lang="en-US" dirty="0"/>
-              <a:t> </a:t>
-            </a:r>
-            <a:r>
-              <a:rPr lang="en-US" dirty="0" smtClean="0"/>
-              <a:t>ASP.NET</a:t>
-            </a:r>
-          </a:p>
-          <a:p>
-            <a:r>
-              <a:rPr lang="en-US" dirty="0"/>
-              <a:t> </a:t>
-            </a:r>
-            <a:r>
-              <a:rPr lang="en-US" dirty="0" smtClean="0"/>
-              <a:t>Graphing Libraries</a:t>
-            </a:r>
-          </a:p>
-          <a:p>
-            <a:r>
-              <a:rPr lang="en-US" dirty="0"/>
-              <a:t> </a:t>
-            </a:r>
-            <a:r>
-              <a:rPr lang="en-US" dirty="0" smtClean="0"/>
-              <a:t>Test Upload Controller</a:t>
-            </a:r>
-            <a:endParaRPr lang="en-US" dirty="0"/>
-          </a:p>
-        </p:txBody>
-      </p:sp>
+          <p:cNvPr id="3" name="TextBox 2"/>
+          <p:cNvSpPr txBox="1"/>
+          <p:nvPr/>
+        </p:nvSpPr>
+        <p:spPr>
+          <a:xfrm>
+            <a:off x="958600" y="714732"/>
+            <a:ext cx="3142006" cy="584776"/>
+          </a:xfrm>
+          <a:prstGeom prst="rect">
+            <a:avLst/>
+          </a:prstGeom>
+          <a:noFill/>
+        </p:spPr>
+        <p:txBody>
+          <a:bodyPr wrap="none" rtlCol="0">
+            <a:spAutoFit/>
+          </a:bodyPr>
+          <a:lstStyle/>
+          <a:p>
+            <a:r>
+              <a:rPr lang="en-US" sz="3200" dirty="0" smtClean="0"/>
+              <a:t>Database Design</a:t>
+            </a:r>
+            <a:endParaRPr lang="en-US" sz="3200" dirty="0"/>
+          </a:p>
+        </p:txBody>
+      </p:sp>
+      <p:pic>
+        <p:nvPicPr>
+          <p:cNvPr id="4" name="Picture 3" descr="Screen Shot 2015-01-28 at 6.45.57 PM.png"/>
+          <p:cNvPicPr>
+            <a:picLocks noChangeAspect="1"/>
+          </p:cNvPicPr>
+          <p:nvPr/>
+        </p:nvPicPr>
+        <p:blipFill>
+          <a:blip r:embed="rId2">
+            <a:extLst>
+              <a:ext uri="{28A0092B-C50C-407E-A947-70E740481C1C}">
+                <a14:useLocalDpi xmlns:a14="http://schemas.microsoft.com/office/drawing/2010/main" val="0"/>
+              </a:ext>
+            </a:extLst>
+          </a:blip>
+          <a:stretch>
+            <a:fillRect/>
+          </a:stretch>
+        </p:blipFill>
+        <p:spPr>
+          <a:xfrm>
+            <a:off x="429846" y="117230"/>
+            <a:ext cx="8225692" cy="6389078"/>
+          </a:xfrm>
+          <a:prstGeom prst="rect">
+            <a:avLst/>
+          </a:prstGeom>
+        </p:spPr>
+      </p:pic>
     </p:spTree>
     <p:extLst>
       <p:ext uri="{BB962C8B-B14F-4D97-AF65-F5344CB8AC3E}">
-        <p14:creationId xmlns:p14="http://schemas.microsoft.com/office/powerpoint/2010/main" val="522606889"/>
+        <p14:creationId xmlns:p14="http://schemas.microsoft.com/office/powerpoint/2010/main" val="246278495"/>
       </p:ext>
     </p:extLst>
   </p:cSld>
   <p:clrMapOvr>
     <a:masterClrMapping/>
   </p:clrMapOvr>
-  <mc:AlternateContent xmlns:mc="http://schemas.openxmlformats.org/markup-compatibility/2006">
-    <mc:Choice xmlns:p14="http://schemas.microsoft.com/office/powerpoint/2010/main" Requires="p14">
-      <p:transition spd="slow" p14:dur="2000"/>
-    </mc:Choice>
-    <mc:Fallback>
-      <p:transition xmlns:p14="http://schemas.microsoft.com/office/powerpoint/2010/main" spd="slow"/>
-    </mc:Fallback>
-  </mc:AlternateContent>
   <p:timing>
     <p:tnLst>
       <p:par>
@@ -7081,98 +6953,192 @@
           <a:chExt cx="0" cy="0"/>
         </a:xfrm>
       </p:grpSpPr>
-      <p:sp>
-        <p:nvSpPr>
-          <p:cNvPr id="2" name="Title 1"/>
-          <p:cNvSpPr>
-            <a:spLocks noGrp="1"/>
-          </p:cNvSpPr>
-          <p:nvPr>
-            <p:ph type="title"/>
-          </p:nvPr>
-        </p:nvSpPr>
-        <p:spPr/>
-        <p:txBody>
-          <a:bodyPr/>
-          <a:lstStyle/>
-          <a:p>
-            <a:r>
-              <a:rPr lang="en-US" dirty="0" smtClean="0"/>
-              <a:t>Iteration 1</a:t>
-            </a:r>
-            <a:endParaRPr lang="en-US" dirty="0"/>
-          </a:p>
-        </p:txBody>
-      </p:sp>
-      <p:sp>
-        <p:nvSpPr>
-          <p:cNvPr id="3" name="Content Placeholder 2"/>
-          <p:cNvSpPr>
-            <a:spLocks noGrp="1"/>
-          </p:cNvSpPr>
-          <p:nvPr>
-            <p:ph idx="1"/>
-          </p:nvPr>
-        </p:nvSpPr>
-        <p:spPr/>
-        <p:txBody>
-          <a:bodyPr/>
-          <a:lstStyle/>
-          <a:p>
-            <a:r>
-              <a:rPr lang="en-US" dirty="0" smtClean="0"/>
-              <a:t> </a:t>
-            </a:r>
-            <a:r>
-              <a:rPr lang="en-US" i="1" dirty="0"/>
-              <a:t>December 15, 2014</a:t>
-            </a:r>
-            <a:r>
-              <a:rPr lang="en-US" u="sng" dirty="0"/>
-              <a:t> </a:t>
-            </a:r>
-            <a:r>
-              <a:rPr lang="en-US" u="sng" dirty="0" smtClean="0"/>
-              <a:t> </a:t>
-            </a:r>
-          </a:p>
-          <a:p>
-            <a:r>
-              <a:rPr lang="en-US" dirty="0" smtClean="0"/>
-              <a:t> Complete Project Database</a:t>
-            </a:r>
-          </a:p>
-          <a:p>
-            <a:r>
-              <a:rPr lang="en-US" dirty="0" smtClean="0"/>
-              <a:t> Upload to database via prototype</a:t>
-            </a:r>
-          </a:p>
-          <a:p>
-            <a:r>
-              <a:rPr lang="en-US" dirty="0" smtClean="0"/>
-              <a:t> Website Skeleton Complete</a:t>
-            </a:r>
-          </a:p>
-          <a:p>
-            <a:r>
-              <a:rPr lang="en-US" dirty="0" smtClean="0"/>
-              <a:t> Complete Documents</a:t>
-            </a:r>
-          </a:p>
-          <a:p>
-            <a:r>
-              <a:rPr lang="en-US" dirty="0" smtClean="0"/>
-              <a:t> Begin Unit test development   </a:t>
-            </a:r>
-            <a:endParaRPr lang="en-US" dirty="0"/>
+      <p:graphicFrame>
+        <p:nvGraphicFramePr>
+          <p:cNvPr id="2" name="Object 1"/>
+          <p:cNvGraphicFramePr>
+            <a:graphicFrameLocks noChangeAspect="1"/>
+          </p:cNvGraphicFramePr>
+          <p:nvPr>
+            <p:extLst>
+              <p:ext uri="{D42A27DB-BD31-4B8C-83A1-F6EECF244321}">
+                <p14:modId xmlns:p14="http://schemas.microsoft.com/office/powerpoint/2010/main" val="3523488162"/>
+              </p:ext>
+            </p:extLst>
+          </p:nvPr>
+        </p:nvGraphicFramePr>
+        <p:xfrm>
+          <a:off x="1355720" y="2560334"/>
+          <a:ext cx="3021013" cy="2743200"/>
+        </p:xfrm>
+        <a:graphic>
+          <a:graphicData uri="http://schemas.openxmlformats.org/presentationml/2006/ole">
+            <mc:AlternateContent xmlns:mc="http://schemas.openxmlformats.org/markup-compatibility/2006">
+              <mc:Choice xmlns:v="urn:schemas-microsoft-com:vml" Requires="v">
+                <p:oleObj spid="_x0000_s1064" r:id="rId3" imgW="3035300" imgH="2755900" progId="">
+                  <p:embed/>
+                </p:oleObj>
+              </mc:Choice>
+              <mc:Fallback>
+                <p:oleObj r:id="rId3" imgW="3035300" imgH="2755900" progId="">
+                  <p:embed/>
+                  <p:pic>
+                    <p:nvPicPr>
+                      <p:cNvPr id="0" name="Object 1"/>
+                      <p:cNvPicPr>
+                        <a:picLocks noChangeAspect="1" noChangeArrowheads="1"/>
+                      </p:cNvPicPr>
+                      <p:nvPr/>
+                    </p:nvPicPr>
+                    <p:blipFill>
+                      <a:blip r:embed="rId4">
+                        <a:extLst>
+                          <a:ext uri="{28A0092B-C50C-407E-A947-70E740481C1C}">
+                            <a14:useLocalDpi xmlns:a14="http://schemas.microsoft.com/office/drawing/2010/main" val="0"/>
+                          </a:ext>
+                        </a:extLst>
+                      </a:blip>
+                      <a:srcRect/>
+                      <a:stretch>
+                        <a:fillRect/>
+                      </a:stretch>
+                    </p:blipFill>
+                    <p:spPr bwMode="auto">
+                      <a:xfrm>
+                        <a:off x="1355720" y="2560334"/>
+                        <a:ext cx="3021013" cy="2743200"/>
+                      </a:xfrm>
+                      <a:prstGeom prst="rect">
+                        <a:avLst/>
+                      </a:prstGeom>
+                      <a:noFill/>
+                      <a:extLst>
+                        <a:ext uri="{909E8E84-426E-40dd-AFC4-6F175D3DCCD1}">
+                          <a14:hiddenFill xmlns:a14="http://schemas.microsoft.com/office/drawing/2010/main">
+                            <a:solidFill>
+                              <a:srgbClr val="FFFFFF"/>
+                            </a:solidFill>
+                          </a14:hiddenFill>
+                        </a:ext>
+                      </a:extLst>
+                    </p:spPr>
+                  </p:pic>
+                </p:oleObj>
+              </mc:Fallback>
+            </mc:AlternateContent>
+          </a:graphicData>
+        </a:graphic>
+      </p:graphicFrame>
+      <p:graphicFrame>
+        <p:nvGraphicFramePr>
+          <p:cNvPr id="3" name="Object 2"/>
+          <p:cNvGraphicFramePr>
+            <a:graphicFrameLocks noChangeAspect="1"/>
+          </p:cNvGraphicFramePr>
+          <p:nvPr>
+            <p:extLst>
+              <p:ext uri="{D42A27DB-BD31-4B8C-83A1-F6EECF244321}">
+                <p14:modId xmlns:p14="http://schemas.microsoft.com/office/powerpoint/2010/main" val="1351596661"/>
+              </p:ext>
+            </p:extLst>
+          </p:nvPr>
+        </p:nvGraphicFramePr>
+        <p:xfrm>
+          <a:off x="4739129" y="2000293"/>
+          <a:ext cx="3290887" cy="3886200"/>
+        </p:xfrm>
+        <a:graphic>
+          <a:graphicData uri="http://schemas.openxmlformats.org/presentationml/2006/ole">
+            <mc:AlternateContent xmlns:mc="http://schemas.openxmlformats.org/markup-compatibility/2006">
+              <mc:Choice xmlns:v="urn:schemas-microsoft-com:vml" Requires="v">
+                <p:oleObj spid="_x0000_s1065" r:id="rId5" imgW="3302000" imgH="3898900" progId="">
+                  <p:embed/>
+                </p:oleObj>
+              </mc:Choice>
+              <mc:Fallback>
+                <p:oleObj r:id="rId5" imgW="3302000" imgH="3898900" progId="">
+                  <p:embed/>
+                  <p:pic>
+                    <p:nvPicPr>
+                      <p:cNvPr id="0" name="Object 2"/>
+                      <p:cNvPicPr>
+                        <a:picLocks noChangeAspect="1" noChangeArrowheads="1"/>
+                      </p:cNvPicPr>
+                      <p:nvPr/>
+                    </p:nvPicPr>
+                    <p:blipFill>
+                      <a:blip r:embed="rId6">
+                        <a:extLst>
+                          <a:ext uri="{28A0092B-C50C-407E-A947-70E740481C1C}">
+                            <a14:useLocalDpi xmlns:a14="http://schemas.microsoft.com/office/drawing/2010/main" val="0"/>
+                          </a:ext>
+                        </a:extLst>
+                      </a:blip>
+                      <a:srcRect/>
+                      <a:stretch>
+                        <a:fillRect/>
+                      </a:stretch>
+                    </p:blipFill>
+                    <p:spPr bwMode="auto">
+                      <a:xfrm>
+                        <a:off x="4739129" y="2000293"/>
+                        <a:ext cx="3290887" cy="3886200"/>
+                      </a:xfrm>
+                      <a:prstGeom prst="rect">
+                        <a:avLst/>
+                      </a:prstGeom>
+                      <a:noFill/>
+                      <a:extLst>
+                        <a:ext uri="{909E8E84-426E-40dd-AFC4-6F175D3DCCD1}">
+                          <a14:hiddenFill xmlns:a14="http://schemas.microsoft.com/office/drawing/2010/main">
+                            <a:solidFill>
+                              <a:srgbClr val="FFFFFF"/>
+                            </a:solidFill>
+                          </a14:hiddenFill>
+                        </a:ext>
+                      </a:extLst>
+                    </p:spPr>
+                  </p:pic>
+                </p:oleObj>
+              </mc:Fallback>
+            </mc:AlternateContent>
+          </a:graphicData>
+        </a:graphic>
+      </p:graphicFrame>
+      <p:sp>
+        <p:nvSpPr>
+          <p:cNvPr id="4" name="TextBox 3"/>
+          <p:cNvSpPr txBox="1"/>
+          <p:nvPr/>
+        </p:nvSpPr>
+        <p:spPr>
+          <a:xfrm>
+            <a:off x="1355720" y="997970"/>
+            <a:ext cx="1763323" cy="523220"/>
+          </a:xfrm>
+          <a:prstGeom prst="rect">
+            <a:avLst/>
+          </a:prstGeom>
+          <a:noFill/>
+        </p:spPr>
+        <p:txBody>
+          <a:bodyPr wrap="none" rtlCol="0">
+            <a:spAutoFit/>
+          </a:bodyPr>
+          <a:lstStyle/>
+          <a:p>
+            <a:r>
+              <a:rPr lang="en-US" sz="2800" dirty="0" smtClean="0"/>
+              <a:t>Use Cases</a:t>
+            </a:r>
+            <a:endParaRPr lang="en-US" sz="2800" dirty="0"/>
           </a:p>
         </p:txBody>
       </p:sp>
     </p:spTree>
     <p:extLst>
       <p:ext uri="{BB962C8B-B14F-4D97-AF65-F5344CB8AC3E}">
-        <p14:creationId xmlns:p14="http://schemas.microsoft.com/office/powerpoint/2010/main" val="2477221972"/>
+        <p14:creationId xmlns:p14="http://schemas.microsoft.com/office/powerpoint/2010/main" val="476663040"/>
       </p:ext>
     </p:extLst>
   </p:cSld>
@@ -7208,7 +7174,7 @@
       </p:grpSpPr>
       <p:sp>
         <p:nvSpPr>
-          <p:cNvPr id="2" name="Title 1"/>
+          <p:cNvPr id="8" name="Title 7"/>
           <p:cNvSpPr>
             <a:spLocks noGrp="1"/>
           </p:cNvSpPr>
@@ -7223,107 +7189,139 @@
           <a:p>
             <a:r>
               <a:rPr lang="en-US" dirty="0"/>
-              <a:t>Iteration </a:t>
-            </a:r>
-            <a:r>
-              <a:rPr lang="en-US" dirty="0" smtClean="0"/>
-              <a:t>2</a:t>
-            </a:r>
-            <a:endParaRPr lang="en-US" dirty="0"/>
-          </a:p>
-        </p:txBody>
-      </p:sp>
-      <p:sp>
-        <p:nvSpPr>
-          <p:cNvPr id="3" name="Content Placeholder 2"/>
-          <p:cNvSpPr>
-            <a:spLocks noGrp="1"/>
-          </p:cNvSpPr>
-          <p:nvPr>
-            <p:ph idx="1"/>
-          </p:nvPr>
-        </p:nvSpPr>
-        <p:spPr/>
-        <p:txBody>
-          <a:bodyPr>
-            <a:normAutofit lnSpcReduction="10000"/>
-          </a:bodyPr>
-          <a:lstStyle/>
-          <a:p>
-            <a:pPr lvl="0"/>
+              <a:t>Technologies Used</a:t>
+            </a:r>
+          </a:p>
+        </p:txBody>
+      </p:sp>
+      <p:sp>
+        <p:nvSpPr>
+          <p:cNvPr id="9" name="Content Placeholder 8"/>
+          <p:cNvSpPr>
+            <a:spLocks noGrp="1"/>
+          </p:cNvSpPr>
+          <p:nvPr>
+            <p:ph sz="quarter" idx="13"/>
+          </p:nvPr>
+        </p:nvSpPr>
+        <p:spPr>
+          <a:xfrm>
+            <a:off x="956524" y="2111028"/>
+            <a:ext cx="3556861" cy="3602736"/>
+          </a:xfrm>
+        </p:spPr>
+        <p:txBody>
+          <a:bodyPr/>
+          <a:lstStyle/>
+          <a:p>
             <a:r>
               <a:rPr lang="en-US" dirty="0" smtClean="0"/>
               <a:t> </a:t>
             </a:r>
             <a:r>
-              <a:rPr lang="en-US" b="1" i="1" dirty="0"/>
-              <a:t>February 8, 2015</a:t>
-            </a:r>
+              <a:rPr lang="en-US" b="1" u="sng" dirty="0" smtClean="0"/>
+              <a:t>Database</a:t>
+            </a:r>
+          </a:p>
+          <a:p>
+            <a:pPr lvl="1"/>
             <a:r>
               <a:rPr lang="en-US" dirty="0"/>
               <a:t> </a:t>
             </a:r>
             <a:r>
               <a:rPr lang="en-US" dirty="0" smtClean="0"/>
+              <a:t>MySQL 5</a:t>
+            </a:r>
+          </a:p>
+          <a:p>
+            <a:pPr lvl="1"/>
+            <a:r>
+              <a:rPr lang="en-US" dirty="0"/>
               <a:t> </a:t>
             </a:r>
-          </a:p>
-          <a:p>
-            <a:pPr lvl="0"/>
             <a:r>
               <a:rPr lang="en-US" dirty="0" smtClean="0"/>
-              <a:t> Web </a:t>
-            </a:r>
+              <a:t>MySQL Workbench 6.2</a:t>
+            </a:r>
+          </a:p>
+          <a:p>
+            <a:pPr lvl="1"/>
             <a:r>
               <a:rPr lang="en-US" dirty="0"/>
-              <a:t>application completed (including database update mechanism)</a:t>
-            </a:r>
-          </a:p>
-          <a:p>
-            <a:pPr lvl="0"/>
+              <a:t> </a:t>
+            </a:r>
+            <a:r>
+              <a:rPr lang="en-US" dirty="0" err="1" smtClean="0"/>
+              <a:t>phpMyAdmin</a:t>
+            </a:r>
             <a:r>
               <a:rPr lang="en-US" dirty="0" smtClean="0"/>
-              <a:t> Web application unit tests complete</a:t>
-            </a:r>
+              <a:t> 4</a:t>
+            </a:r>
+          </a:p>
+          <a:p>
+            <a:pPr lvl="1"/>
+            <a:endParaRPr lang="en-US" dirty="0" smtClean="0"/>
+          </a:p>
+          <a:p>
+            <a:pPr lvl="1"/>
             <a:endParaRPr lang="en-US" dirty="0"/>
           </a:p>
-          <a:p>
-            <a:pPr lvl="0"/>
+        </p:txBody>
+      </p:sp>
+      <p:sp>
+        <p:nvSpPr>
+          <p:cNvPr id="10" name="Content Placeholder 9"/>
+          <p:cNvSpPr>
+            <a:spLocks noGrp="1"/>
+          </p:cNvSpPr>
+          <p:nvPr>
+            <p:ph sz="quarter" idx="14"/>
+          </p:nvPr>
+        </p:nvSpPr>
+        <p:spPr/>
+        <p:txBody>
+          <a:bodyPr/>
+          <a:lstStyle/>
+          <a:p>
             <a:r>
               <a:rPr lang="en-US" dirty="0" smtClean="0"/>
-              <a:t> Web </a:t>
-            </a:r>
+              <a:t> </a:t>
+            </a:r>
+            <a:r>
+              <a:rPr lang="en-US" b="1" u="sng" dirty="0" smtClean="0"/>
+              <a:t>Web Application</a:t>
+            </a:r>
+          </a:p>
+          <a:p>
+            <a:pPr lvl="1"/>
+            <a:r>
+              <a:rPr lang="en-US" dirty="0" smtClean="0"/>
+              <a:t> CakePHP 2.6.1</a:t>
+            </a:r>
+          </a:p>
+          <a:p>
+            <a:pPr lvl="1"/>
             <a:r>
               <a:rPr lang="en-US" dirty="0"/>
-              <a:t>application integration test development has begun</a:t>
-            </a:r>
-          </a:p>
-          <a:p>
-            <a:pPr lvl="0"/>
+              <a:t> </a:t>
+            </a:r>
             <a:r>
               <a:rPr lang="en-US" dirty="0" smtClean="0"/>
-              <a:t> Website </a:t>
-            </a:r>
-            <a:r>
-              <a:rPr lang="en-US" dirty="0"/>
-              <a:t>design finalized</a:t>
-            </a:r>
-          </a:p>
-          <a:p>
-            <a:pPr lvl="0"/>
+              <a:t>Microsoft IIS</a:t>
+            </a:r>
+          </a:p>
+          <a:p>
+            <a:pPr lvl="1"/>
             <a:r>
               <a:rPr lang="en-US" dirty="0" smtClean="0"/>
-              <a:t> First </a:t>
-            </a:r>
-            <a:r>
-              <a:rPr lang="en-US" dirty="0"/>
-              <a:t>round of analytics prototyped along with beginning unit tests</a:t>
-            </a:r>
-          </a:p>
-          <a:p>
-            <a:pPr marL="0" indent="0">
-              <a:buNone/>
-            </a:pPr>
+              <a:t> </a:t>
+            </a:r>
+            <a:r>
+              <a:rPr lang="en-US" dirty="0" err="1" smtClean="0"/>
+              <a:t>GitHub</a:t>
+            </a:r>
             <a:endParaRPr lang="en-US" dirty="0"/>
           </a:p>
         </p:txBody>
@@ -7331,7 +7329,7 @@
     </p:spTree>
     <p:extLst>
       <p:ext uri="{BB962C8B-B14F-4D97-AF65-F5344CB8AC3E}">
-        <p14:creationId xmlns:p14="http://schemas.microsoft.com/office/powerpoint/2010/main" val="3369431712"/>
+        <p14:creationId xmlns:p14="http://schemas.microsoft.com/office/powerpoint/2010/main" val="4133639271"/>
       </p:ext>
     </p:extLst>
   </p:cSld>
@@ -7349,7 +7347,7 @@
 </file>
 
 <file path=ppt/slides/slide9.xml><?xml version="1.0" encoding="utf-8"?>
-<p:sld xmlns:a="http://schemas.openxmlformats.org/drawingml/2006/main" xmlns:r="http://schemas.openxmlformats.org/officeDocument/2006/relationships" xmlns:p="http://schemas.openxmlformats.org/presentationml/2006/main">
+<p:sld xmlns:a="http://schemas.openxmlformats.org/drawingml/2006/main" xmlns:r="http://schemas.openxmlformats.org/officeDocument/2006/relationships" xmlns:p="http://schemas.openxmlformats.org/presentationml/2006/main" show="0">
   <p:cSld>
     <p:spTree>
       <p:nvGrpSpPr>
@@ -7381,12 +7379,8 @@
           <a:lstStyle/>
           <a:p>
             <a:r>
-              <a:rPr lang="en-US" dirty="0"/>
-              <a:t>Iteration </a:t>
-            </a:r>
-            <a:r>
               <a:rPr lang="en-US" dirty="0" smtClean="0"/>
-              <a:t>3</a:t>
+              <a:t>Goals For Break</a:t>
             </a:r>
             <a:endParaRPr lang="en-US" dirty="0"/>
           </a:p>
@@ -7407,47 +7401,40 @@
           <a:bodyPr/>
           <a:lstStyle/>
           <a:p>
-            <a:pPr lvl="0"/>
             <a:r>
               <a:rPr lang="en-US" dirty="0" smtClean="0"/>
-              <a:t> </a:t>
-            </a:r>
-            <a:r>
-              <a:rPr lang="en-US" b="1" i="1" dirty="0"/>
-              <a:t>March 8, 2015</a:t>
-            </a:r>
+              <a:t> Learn Unit Testing Methodologies</a:t>
+            </a:r>
+          </a:p>
+          <a:p>
             <a:r>
               <a:rPr lang="en-US" dirty="0"/>
               <a:t> </a:t>
             </a:r>
             <a:r>
               <a:rPr lang="en-US" dirty="0" smtClean="0"/>
+              <a:t>ASP.NET</a:t>
+            </a:r>
+          </a:p>
+          <a:p>
+            <a:r>
+              <a:rPr lang="en-US" dirty="0"/>
               <a:t> </a:t>
             </a:r>
-          </a:p>
-          <a:p>
-            <a:pPr lvl="0"/>
             <a:r>
               <a:rPr lang="en-US" dirty="0" smtClean="0"/>
-              <a:t> Second </a:t>
-            </a:r>
+              <a:t>Graphing Libraries</a:t>
+            </a:r>
+          </a:p>
+          <a:p>
             <a:r>
               <a:rPr lang="en-US" dirty="0"/>
-              <a:t>round of analytics prototyped along with beginning unit tests</a:t>
-            </a:r>
-          </a:p>
-          <a:p>
-            <a:pPr lvl="0"/>
+              <a:t> </a:t>
+            </a:r>
             <a:r>
               <a:rPr lang="en-US" dirty="0" smtClean="0"/>
-              <a:t> First </a:t>
-            </a:r>
-            <a:r>
-              <a:rPr lang="en-US" dirty="0"/>
-              <a:t>round of analytics finalized along with integration tests</a:t>
-            </a:r>
-          </a:p>
-          <a:p>
+              <a:t>Test Upload Controller</a:t>
+            </a:r>
             <a:endParaRPr lang="en-US" dirty="0"/>
           </a:p>
         </p:txBody>
@@ -7455,13 +7442,21 @@
     </p:spTree>
     <p:extLst>
       <p:ext uri="{BB962C8B-B14F-4D97-AF65-F5344CB8AC3E}">
-        <p14:creationId xmlns:p14="http://schemas.microsoft.com/office/powerpoint/2010/main" val="2766940533"/>
+        <p14:creationId xmlns:p14="http://schemas.microsoft.com/office/powerpoint/2010/main" val="522606889"/>
       </p:ext>
     </p:extLst>
   </p:cSld>
   <p:clrMapOvr>
     <a:masterClrMapping/>
   </p:clrMapOvr>
+  <mc:AlternateContent xmlns:mc="http://schemas.openxmlformats.org/markup-compatibility/2006">
+    <mc:Choice xmlns:p14="http://schemas.microsoft.com/office/powerpoint/2010/main" Requires="p14">
+      <p:transition spd="slow" p14:dur="2000"/>
+    </mc:Choice>
+    <mc:Fallback>
+      <p:transition xmlns:p14="http://schemas.microsoft.com/office/powerpoint/2010/main" spd="slow"/>
+    </mc:Fallback>
+  </mc:AlternateContent>
   <p:timing>
     <p:tnLst>
       <p:par>

</xml_diff>